<commit_message>
- Added terminoloogies section - Changed PDf content - Changed PDF formatting - Regenerated pptx
</commit_message>
<xml_diff>
--- a/Documents/r-reporters-powerpoint.pptx
+++ b/Documents/r-reporters-powerpoint.pptx
@@ -5,10 +5,10 @@
     <p:sldMasterId id="2147483648" r:id="rId1"/>
   </p:sldMasterIdLst>
   <p:sldIdLst>
-    <p:sldId id="1897518063" r:id="rId6"/>
-    <p:sldId id="504440252" r:id="rId7"/>
-    <p:sldId id="443529999" r:id="rId8"/>
-    <p:sldId id="1060096306" r:id="rId9"/>
+    <p:sldId id="1018584045" r:id="rId6"/>
+    <p:sldId id="663395829" r:id="rId7"/>
+    <p:sldId id="1805846724" r:id="rId8"/>
+    <p:sldId id="383354239" r:id="rId9"/>
   </p:sldIdLst>
   <p:sldSz cx="12192000" cy="6858000"/>
   <p:notesSz cx="6858000" cy="9144000"/>
@@ -3063,7 +3063,7 @@
           <a:p>
             <a:r>
               <a:rPr/>
-              <a:t>2017-03-26</a:t>
+              <a:t>2017-04-28</a:t>
             </a:r>
           </a:p>
         </p:txBody>

</xml_diff>